<commit_message>
Updated Agenda and Goals
Signed-off-by: MatteoBasili <matthew2000.mb@gmail.com>
</commit_message>
<xml_diff>
--- a/ShiftsHappen/Sprint 3/CSW Sprint 3.pptx
+++ b/ShiftsHappen/Sprint 3/CSW Sprint 3.pptx
@@ -216,7 +216,7 @@
           </a:lstStyle>
           <a:p>
             <a:fld id="{7D50F5C2-1F77-45FD-808B-AC99B6454F11}" type="datetimeFigureOut">
-              <a:t>25/01/2025</a:t>
+              <a:t>1/26/2025</a:t>
             </a:fld>
             <a:endParaRPr lang="it-IT"/>
           </a:p>
@@ -1102,7 +1102,7 @@
           <a:p>
             <a:fld id="{F64A8E5F-40E5-4553-9F3C-699F1A5B8145}" type="datetimeFigureOut">
               <a:rPr lang="de-DE" smtClean="0"/>
-              <a:t>25.01.2025</a:t>
+              <a:t>26.01.2025</a:t>
             </a:fld>
             <a:endParaRPr lang="de-DE"/>
           </a:p>
@@ -1272,7 +1272,7 @@
           <a:p>
             <a:fld id="{F64A8E5F-40E5-4553-9F3C-699F1A5B8145}" type="datetimeFigureOut">
               <a:rPr lang="de-DE" smtClean="0"/>
-              <a:t>25.01.2025</a:t>
+              <a:t>26.01.2025</a:t>
             </a:fld>
             <a:endParaRPr lang="de-DE"/>
           </a:p>
@@ -1452,7 +1452,7 @@
           <a:p>
             <a:fld id="{F64A8E5F-40E5-4553-9F3C-699F1A5B8145}" type="datetimeFigureOut">
               <a:rPr lang="de-DE" smtClean="0"/>
-              <a:t>25.01.2025</a:t>
+              <a:t>26.01.2025</a:t>
             </a:fld>
             <a:endParaRPr lang="de-DE"/>
           </a:p>
@@ -1622,7 +1622,7 @@
           <a:p>
             <a:fld id="{F64A8E5F-40E5-4553-9F3C-699F1A5B8145}" type="datetimeFigureOut">
               <a:rPr lang="de-DE" smtClean="0"/>
-              <a:t>25.01.2025</a:t>
+              <a:t>26.01.2025</a:t>
             </a:fld>
             <a:endParaRPr lang="de-DE"/>
           </a:p>
@@ -1868,7 +1868,7 @@
           <a:p>
             <a:fld id="{F64A8E5F-40E5-4553-9F3C-699F1A5B8145}" type="datetimeFigureOut">
               <a:rPr lang="de-DE" smtClean="0"/>
-              <a:t>25.01.2025</a:t>
+              <a:t>26.01.2025</a:t>
             </a:fld>
             <a:endParaRPr lang="de-DE"/>
           </a:p>
@@ -2100,7 +2100,7 @@
           <a:p>
             <a:fld id="{F64A8E5F-40E5-4553-9F3C-699F1A5B8145}" type="datetimeFigureOut">
               <a:rPr lang="de-DE" smtClean="0"/>
-              <a:t>25.01.2025</a:t>
+              <a:t>26.01.2025</a:t>
             </a:fld>
             <a:endParaRPr lang="de-DE"/>
           </a:p>
@@ -2467,7 +2467,7 @@
           <a:p>
             <a:fld id="{F64A8E5F-40E5-4553-9F3C-699F1A5B8145}" type="datetimeFigureOut">
               <a:rPr lang="de-DE" smtClean="0"/>
-              <a:t>25.01.2025</a:t>
+              <a:t>26.01.2025</a:t>
             </a:fld>
             <a:endParaRPr lang="de-DE"/>
           </a:p>
@@ -2585,7 +2585,7 @@
           <a:p>
             <a:fld id="{F64A8E5F-40E5-4553-9F3C-699F1A5B8145}" type="datetimeFigureOut">
               <a:rPr lang="de-DE" smtClean="0"/>
-              <a:t>25.01.2025</a:t>
+              <a:t>26.01.2025</a:t>
             </a:fld>
             <a:endParaRPr lang="de-DE"/>
           </a:p>
@@ -2680,7 +2680,7 @@
           <a:p>
             <a:fld id="{F64A8E5F-40E5-4553-9F3C-699F1A5B8145}" type="datetimeFigureOut">
               <a:rPr lang="de-DE" smtClean="0"/>
-              <a:t>25.01.2025</a:t>
+              <a:t>26.01.2025</a:t>
             </a:fld>
             <a:endParaRPr lang="de-DE"/>
           </a:p>
@@ -2957,7 +2957,7 @@
           <a:p>
             <a:fld id="{F64A8E5F-40E5-4553-9F3C-699F1A5B8145}" type="datetimeFigureOut">
               <a:rPr lang="de-DE" smtClean="0"/>
-              <a:t>25.01.2025</a:t>
+              <a:t>26.01.2025</a:t>
             </a:fld>
             <a:endParaRPr lang="de-DE"/>
           </a:p>
@@ -3210,7 +3210,7 @@
           <a:p>
             <a:fld id="{F64A8E5F-40E5-4553-9F3C-699F1A5B8145}" type="datetimeFigureOut">
               <a:rPr lang="de-DE" smtClean="0"/>
-              <a:t>25.01.2025</a:t>
+              <a:t>26.01.2025</a:t>
             </a:fld>
             <a:endParaRPr lang="de-DE"/>
           </a:p>
@@ -3423,7 +3423,7 @@
           <a:p>
             <a:fld id="{F64A8E5F-40E5-4553-9F3C-699F1A5B8145}" type="datetimeFigureOut">
               <a:rPr lang="de-DE" smtClean="0"/>
-              <a:t>25.01.2025</a:t>
+              <a:t>26.01.2025</a:t>
             </a:fld>
             <a:endParaRPr lang="de-DE"/>
           </a:p>
@@ -13782,9 +13782,9 @@
         <p:grpSpPr>
           <a:xfrm>
             <a:off x="1497813" y="2213473"/>
-            <a:ext cx="3147381" cy="391777"/>
+            <a:ext cx="4143038" cy="391777"/>
             <a:chOff x="991771" y="3286563"/>
-            <a:chExt cx="3147381" cy="391777"/>
+            <a:chExt cx="4143038" cy="391777"/>
           </a:xfrm>
         </p:grpSpPr>
         <p:sp>
@@ -13803,7 +13803,7 @@
           <p:spPr>
             <a:xfrm>
               <a:off x="1462009" y="3309008"/>
-              <a:ext cx="2677143" cy="369332"/>
+              <a:ext cx="3672800" cy="369332"/>
             </a:xfrm>
             <a:prstGeom prst="rect">
               <a:avLst/>
@@ -13849,12 +13849,20 @@
                 <a:t> </a:t>
               </a:r>
               <a:r>
-                <a:rPr lang="it-IT" u="sng" noProof="0" dirty="0" err="1">
+                <a:rPr lang="it-IT" u="sng" noProof="0" dirty="0" smtClean="0">
                   <a:solidFill>
                     <a:schemeClr val="accent1"/>
                   </a:solidFill>
                 </a:rPr>
-                <a:t>integration</a:t>
+                <a:t>data </a:t>
+              </a:r>
+              <a:r>
+                <a:rPr lang="it-IT" u="sng" noProof="0" dirty="0" err="1" smtClean="0">
+                  <a:solidFill>
+                    <a:schemeClr val="accent1"/>
+                  </a:solidFill>
+                </a:rPr>
+                <a:t>segregation</a:t>
               </a:r>
               <a:endParaRPr lang="it-IT" u="sng" noProof="0" dirty="0">
                 <a:solidFill>
@@ -14988,7 +14996,7 @@
         <p:spPr>
           <a:xfrm>
             <a:off x="639724" y="1664942"/>
-            <a:ext cx="6654056" cy="3693319"/>
+            <a:ext cx="6654056" cy="3970318"/>
           </a:xfrm>
           <a:prstGeom prst="rect">
             <a:avLst/>
@@ -15006,7 +15014,7 @@
               <a:buAutoNum type="arabicPeriod"/>
             </a:pPr>
             <a:r>
-              <a:rPr lang="it-IT" noProof="0" dirty="0">
+              <a:rPr lang="it-IT" noProof="0" dirty="0" smtClean="0">
                 <a:solidFill>
                   <a:schemeClr val="tx1">
                     <a:lumMod val="85000"/>
@@ -15014,10 +15022,10 @@
                   </a:schemeClr>
                 </a:solidFill>
               </a:rPr>
-              <a:t>Integrare i prototipi di </a:t>
+              <a:t>Realizzare la segregazione dei dati nelle due soluzioni</a:t>
             </a:r>
             <a:r>
-              <a:rPr lang="it-IT" noProof="0" dirty="0" err="1">
+              <a:rPr lang="it-IT" baseline="30000" dirty="0">
                 <a:solidFill>
                   <a:schemeClr val="tx1">
                     <a:lumMod val="85000"/>
@@ -15025,7 +15033,29 @@
                   </a:schemeClr>
                 </a:solidFill>
               </a:rPr>
-              <a:t>multitenancy</a:t>
+              <a:t>1</a:t>
+            </a:r>
+            <a:r>
+              <a:rPr lang="it-IT" noProof="0" dirty="0" smtClean="0">
+                <a:solidFill>
+                  <a:schemeClr val="tx1">
+                    <a:lumMod val="85000"/>
+                    <a:lumOff val="15000"/>
+                  </a:schemeClr>
+                </a:solidFill>
+              </a:rPr>
+              <a:t> di multi-</a:t>
+            </a:r>
+            <a:r>
+              <a:rPr lang="it-IT" noProof="0" dirty="0" err="1" smtClean="0">
+                <a:solidFill>
+                  <a:schemeClr val="tx1">
+                    <a:lumMod val="85000"/>
+                    <a:lumOff val="15000"/>
+                  </a:schemeClr>
+                </a:solidFill>
+              </a:rPr>
+              <a:t>tenancy</a:t>
             </a:r>
             <a:r>
               <a:rPr lang="it-IT" noProof="0" dirty="0">
@@ -15036,51 +15066,7 @@
                   </a:schemeClr>
                 </a:solidFill>
               </a:rPr>
-              <a:t> nel </a:t>
-            </a:r>
-            <a:r>
-              <a:rPr lang="it-IT" noProof="0" dirty="0" err="1">
-                <a:solidFill>
-                  <a:schemeClr val="tx1">
-                    <a:lumMod val="85000"/>
-                    <a:lumOff val="15000"/>
-                  </a:schemeClr>
-                </a:solidFill>
-              </a:rPr>
-              <a:t>branch</a:t>
-            </a:r>
-            <a:r>
-              <a:rPr lang="it-IT" noProof="0" dirty="0">
-                <a:solidFill>
-                  <a:schemeClr val="tx1">
-                    <a:lumMod val="85000"/>
-                    <a:lumOff val="15000"/>
-                  </a:schemeClr>
-                </a:solidFill>
-              </a:rPr>
-              <a:t> </a:t>
-            </a:r>
-            <a:r>
-              <a:rPr lang="it-IT" noProof="0" dirty="0" err="1">
-                <a:solidFill>
-                  <a:schemeClr val="tx1">
-                    <a:lumMod val="85000"/>
-                    <a:lumOff val="15000"/>
-                  </a:schemeClr>
-                </a:solidFill>
-              </a:rPr>
-              <a:t>main</a:t>
-            </a:r>
-            <a:r>
-              <a:rPr lang="it-IT" noProof="0" dirty="0">
-                <a:solidFill>
-                  <a:schemeClr val="tx1">
-                    <a:lumMod val="85000"/>
-                    <a:lumOff val="15000"/>
-                  </a:schemeClr>
-                </a:solidFill>
-              </a:rPr>
-              <a:t> e testarli</a:t>
+              <a:t/>
             </a:r>
             <a:br>
               <a:rPr lang="it-IT" noProof="0" dirty="0">
@@ -15092,6 +15078,17 @@
                 </a:solidFill>
               </a:rPr>
             </a:br>
+            <a:r>
+              <a:rPr lang="it-IT" noProof="0" dirty="0">
+                <a:solidFill>
+                  <a:schemeClr val="tx1">
+                    <a:lumMod val="85000"/>
+                    <a:lumOff val="15000"/>
+                  </a:schemeClr>
+                </a:solidFill>
+              </a:rPr>
+              <a:t/>
+            </a:r>
             <a:br>
               <a:rPr lang="it-IT" noProof="0" dirty="0">
                 <a:solidFill>
@@ -15506,7 +15503,7 @@
               <a:t> </a:t>
             </a:r>
             <a:r>
-              <a:rPr lang="it-IT" sz="4000" dirty="0" err="1">
+              <a:rPr lang="it-IT" sz="4000" dirty="0" smtClean="0">
                 <a:solidFill>
                   <a:schemeClr val="tx2">
                     <a:lumMod val="90000"/>
@@ -15514,7 +15511,18 @@
                   </a:schemeClr>
                 </a:solidFill>
               </a:rPr>
-              <a:t>integration</a:t>
+              <a:t>data </a:t>
+            </a:r>
+            <a:r>
+              <a:rPr lang="it-IT" sz="4000" dirty="0" err="1" smtClean="0">
+                <a:solidFill>
+                  <a:schemeClr val="tx2">
+                    <a:lumMod val="90000"/>
+                    <a:lumOff val="10000"/>
+                  </a:schemeClr>
+                </a:solidFill>
+              </a:rPr>
+              <a:t>segregation</a:t>
             </a:r>
             <a:endParaRPr lang="it-IT" sz="4000" noProof="0" dirty="0">
               <a:solidFill>
@@ -17136,6 +17144,17 @@
           </a:bodyPr>
           <a:lstStyle/>
           <a:p>
+            <a:r>
+              <a:rPr lang="it-IT" noProof="0" dirty="0">
+                <a:solidFill>
+                  <a:schemeClr val="tx1">
+                    <a:lumMod val="85000"/>
+                    <a:lumOff val="15000"/>
+                  </a:schemeClr>
+                </a:solidFill>
+              </a:rPr>
+              <a:t/>
+            </a:r>
             <a:br>
               <a:rPr lang="it-IT" noProof="0" dirty="0">
                 <a:solidFill>
@@ -17723,7 +17742,7 @@
                 <a:hlinkClick r:id="rId3">
                   <a:extLst>
                     <a:ext uri="{A12FA001-AC4F-418D-AE19-62706E023703}">
-                      <ahyp:hlinkClr xmlns:ahyp="http://schemas.microsoft.com/office/drawing/2018/hyperlinkcolor" val="tx"/>
+                      <ahyp:hlinkClr xmlns:ahyp="http://schemas.microsoft.com/office/drawing/2018/hyperlinkcolor" xmlns="" val="tx"/>
                     </a:ext>
                   </a:extLst>
                 </a:hlinkClick>
@@ -17752,6 +17771,17 @@
               </a:rPr>
               <a:t>DevExtreme</a:t>
             </a:r>
+            <a:r>
+              <a:rPr lang="it-IT" dirty="0">
+                <a:solidFill>
+                  <a:schemeClr val="tx1">
+                    <a:lumMod val="85000"/>
+                    <a:lumOff val="15000"/>
+                  </a:schemeClr>
+                </a:solidFill>
+              </a:rPr>
+              <a:t/>
+            </a:r>
             <a:br>
               <a:rPr lang="it-IT" dirty="0">
                 <a:solidFill>
@@ -17762,6 +17792,17 @@
                 </a:solidFill>
               </a:rPr>
             </a:br>
+            <a:r>
+              <a:rPr lang="it-IT" dirty="0">
+                <a:solidFill>
+                  <a:schemeClr val="tx1">
+                    <a:lumMod val="85000"/>
+                    <a:lumOff val="15000"/>
+                  </a:schemeClr>
+                </a:solidFill>
+              </a:rPr>
+              <a:t/>
+            </a:r>
             <a:br>
               <a:rPr lang="it-IT" dirty="0">
                 <a:solidFill>
@@ -17772,6 +17813,17 @@
                 </a:solidFill>
               </a:rPr>
             </a:br>
+            <a:r>
+              <a:rPr lang="it-IT" dirty="0">
+                <a:solidFill>
+                  <a:schemeClr val="tx1">
+                    <a:lumMod val="85000"/>
+                    <a:lumOff val="15000"/>
+                  </a:schemeClr>
+                </a:solidFill>
+              </a:rPr>
+              <a:t/>
+            </a:r>
             <a:br>
               <a:rPr lang="it-IT" dirty="0">
                 <a:solidFill>
@@ -17782,6 +17834,17 @@
                 </a:solidFill>
               </a:rPr>
             </a:br>
+            <a:r>
+              <a:rPr lang="it-IT" dirty="0">
+                <a:solidFill>
+                  <a:schemeClr val="tx1">
+                    <a:lumMod val="85000"/>
+                    <a:lumOff val="15000"/>
+                  </a:schemeClr>
+                </a:solidFill>
+              </a:rPr>
+              <a:t/>
+            </a:r>
             <a:br>
               <a:rPr lang="it-IT" dirty="0">
                 <a:solidFill>
@@ -17792,6 +17855,17 @@
                 </a:solidFill>
               </a:rPr>
             </a:br>
+            <a:r>
+              <a:rPr lang="it-IT" dirty="0">
+                <a:solidFill>
+                  <a:schemeClr val="tx1">
+                    <a:lumMod val="85000"/>
+                    <a:lumOff val="15000"/>
+                  </a:schemeClr>
+                </a:solidFill>
+              </a:rPr>
+              <a:t/>
+            </a:r>
             <a:br>
               <a:rPr lang="it-IT" dirty="0">
                 <a:solidFill>
@@ -17802,6 +17876,17 @@
                 </a:solidFill>
               </a:rPr>
             </a:br>
+            <a:r>
+              <a:rPr lang="it-IT" dirty="0">
+                <a:solidFill>
+                  <a:schemeClr val="tx1">
+                    <a:lumMod val="85000"/>
+                    <a:lumOff val="15000"/>
+                  </a:schemeClr>
+                </a:solidFill>
+              </a:rPr>
+              <a:t/>
+            </a:r>
             <a:br>
               <a:rPr lang="it-IT" dirty="0">
                 <a:solidFill>
@@ -17812,6 +17897,17 @@
                 </a:solidFill>
               </a:rPr>
             </a:br>
+            <a:r>
+              <a:rPr lang="it-IT" dirty="0">
+                <a:solidFill>
+                  <a:schemeClr val="tx1">
+                    <a:lumMod val="85000"/>
+                    <a:lumOff val="15000"/>
+                  </a:schemeClr>
+                </a:solidFill>
+              </a:rPr>
+              <a:t/>
+            </a:r>
             <a:br>
               <a:rPr lang="it-IT" dirty="0">
                 <a:solidFill>
@@ -17822,6 +17918,17 @@
                 </a:solidFill>
               </a:rPr>
             </a:br>
+            <a:r>
+              <a:rPr lang="it-IT" dirty="0">
+                <a:solidFill>
+                  <a:schemeClr val="tx1">
+                    <a:lumMod val="85000"/>
+                    <a:lumOff val="15000"/>
+                  </a:schemeClr>
+                </a:solidFill>
+              </a:rPr>
+              <a:t/>
+            </a:r>
             <a:br>
               <a:rPr lang="it-IT" dirty="0">
                 <a:solidFill>
@@ -17832,6 +17939,17 @@
                 </a:solidFill>
               </a:rPr>
             </a:br>
+            <a:r>
+              <a:rPr lang="it-IT" dirty="0">
+                <a:solidFill>
+                  <a:schemeClr val="tx1">
+                    <a:lumMod val="85000"/>
+                    <a:lumOff val="15000"/>
+                  </a:schemeClr>
+                </a:solidFill>
+              </a:rPr>
+              <a:t/>
+            </a:r>
             <a:br>
               <a:rPr lang="it-IT" dirty="0">
                 <a:solidFill>
@@ -17842,6 +17960,17 @@
                 </a:solidFill>
               </a:rPr>
             </a:br>
+            <a:r>
+              <a:rPr lang="it-IT" dirty="0">
+                <a:solidFill>
+                  <a:schemeClr val="tx1">
+                    <a:lumMod val="85000"/>
+                    <a:lumOff val="15000"/>
+                  </a:schemeClr>
+                </a:solidFill>
+              </a:rPr>
+              <a:t/>
+            </a:r>
             <a:br>
               <a:rPr lang="it-IT" dirty="0">
                 <a:solidFill>

</xml_diff>

<commit_message>
Shifts Happen - Slided Sprint 3 Ralisin Code analyses
</commit_message>
<xml_diff>
--- a/ShiftsHappen/Sprint 3/CSW Sprint 3.pptx
+++ b/ShiftsHappen/Sprint 3/CSW Sprint 3.pptx
@@ -23370,8 +23370,8 @@
         </p:nvSpPr>
         <p:spPr>
           <a:xfrm>
-            <a:off x="639726" y="1613118"/>
-            <a:ext cx="6654056" cy="369332"/>
+            <a:off x="639544" y="1613118"/>
+            <a:ext cx="6654056" cy="646331"/>
           </a:xfrm>
           <a:prstGeom prst="rect">
             <a:avLst/>
@@ -23384,21 +23384,190 @@
           </a:bodyPr>
           <a:lstStyle/>
           <a:p>
-            <a:pPr marL="285750" indent="-285750">
-              <a:buFont typeface="Arial" panose="020B0604020202020204" pitchFamily="34" charset="0"/>
-              <a:buChar char="•"/>
-            </a:pPr>
-            <a:r>
-              <a:rPr lang="it-IT" noProof="0" dirty="0">
-                <a:solidFill>
-                  <a:srgbClr val="FF0000"/>
-                </a:solidFill>
-              </a:rPr>
-              <a:t>MASSIMO</a:t>
-            </a:r>
+            <a:r>
+              <a:rPr lang="en-GB" noProof="0" dirty="0"/>
+              <a:t>Per </a:t>
+            </a:r>
+            <a:r>
+              <a:rPr lang="en-GB" noProof="0" dirty="0" err="1"/>
+              <a:t>quel</a:t>
+            </a:r>
+            <a:r>
+              <a:rPr lang="en-GB" noProof="0" dirty="0"/>
+              <a:t> </a:t>
+            </a:r>
+            <a:r>
+              <a:rPr lang="en-GB" noProof="0" dirty="0" err="1"/>
+              <a:t>che</a:t>
+            </a:r>
+            <a:r>
+              <a:rPr lang="en-GB" noProof="0" dirty="0"/>
+              <a:t> </a:t>
+            </a:r>
+            <a:r>
+              <a:rPr lang="en-GB" noProof="0" dirty="0" err="1"/>
+              <a:t>rigurda</a:t>
+            </a:r>
+            <a:r>
+              <a:rPr lang="en-GB" noProof="0" dirty="0"/>
+              <a:t> </a:t>
+            </a:r>
+            <a:r>
+              <a:rPr lang="en-GB" noProof="0" dirty="0" err="1"/>
+              <a:t>i</a:t>
+            </a:r>
+            <a:r>
+              <a:rPr lang="en-GB" noProof="0" dirty="0"/>
+              <a:t> tool di </a:t>
+            </a:r>
+            <a:r>
+              <a:rPr lang="en-GB" noProof="0" dirty="0" err="1"/>
+              <a:t>integrazione</a:t>
+            </a:r>
+            <a:r>
+              <a:rPr lang="en-GB" noProof="0" dirty="0"/>
+              <a:t> </a:t>
+            </a:r>
+            <a:r>
+              <a:rPr lang="en-GB" noProof="0" dirty="0" err="1"/>
+              <a:t>si</a:t>
+            </a:r>
+            <a:r>
+              <a:rPr lang="en-GB" noProof="0" dirty="0"/>
+              <a:t> è </a:t>
+            </a:r>
+            <a:r>
+              <a:rPr lang="en-GB" noProof="0" dirty="0" err="1"/>
+              <a:t>implementato</a:t>
+            </a:r>
+            <a:r>
+              <a:rPr lang="en-GB" noProof="0" dirty="0"/>
+              <a:t> come </a:t>
+            </a:r>
+            <a:r>
+              <a:rPr lang="en-GB" noProof="0" dirty="0" err="1"/>
+              <a:t>stumento</a:t>
+            </a:r>
+            <a:r>
+              <a:rPr lang="en-GB" noProof="0" dirty="0"/>
+              <a:t> </a:t>
+            </a:r>
+            <a:r>
+              <a:rPr lang="en-GB" noProof="0" dirty="0" err="1"/>
+              <a:t>Codacy</a:t>
+            </a:r>
+            <a:r>
+              <a:rPr lang="en-GB" noProof="0" dirty="0"/>
+              <a:t>, </a:t>
+            </a:r>
+            <a:r>
+              <a:rPr lang="en-GB" noProof="0" dirty="0" err="1"/>
+              <a:t>che</a:t>
+            </a:r>
+            <a:r>
+              <a:rPr lang="en-GB" noProof="0" dirty="0"/>
+              <a:t> al </a:t>
+            </a:r>
+            <a:r>
+              <a:rPr lang="en-GB" noProof="0" dirty="0" err="1"/>
+              <a:t>suo</a:t>
+            </a:r>
+            <a:r>
+              <a:rPr lang="en-GB" noProof="0" dirty="0"/>
+              <a:t> </a:t>
+            </a:r>
+            <a:r>
+              <a:rPr lang="en-GB" noProof="0" dirty="0" err="1"/>
+              <a:t>interno</a:t>
+            </a:r>
+            <a:r>
+              <a:rPr lang="en-GB" noProof="0" dirty="0"/>
+              <a:t> </a:t>
+            </a:r>
+            <a:r>
+              <a:rPr lang="en-GB" noProof="0" dirty="0" err="1"/>
+              <a:t>contiene</a:t>
+            </a:r>
+            <a:r>
+              <a:rPr lang="en-GB" noProof="0" dirty="0"/>
+              <a:t> </a:t>
+            </a:r>
+            <a:r>
+              <a:rPr lang="en-GB" noProof="0" dirty="0" err="1"/>
+              <a:t>anche</a:t>
+            </a:r>
+            <a:r>
+              <a:rPr lang="en-GB" noProof="0" dirty="0"/>
+              <a:t> </a:t>
+            </a:r>
+            <a:r>
+              <a:rPr lang="en-GB" noProof="0" dirty="0" err="1"/>
+              <a:t>ESLint</a:t>
+            </a:r>
+            <a:endParaRPr lang="it-IT" noProof="0" dirty="0"/>
           </a:p>
         </p:txBody>
       </p:sp>
+      <p:pic>
+        <p:nvPicPr>
+          <p:cNvPr id="9" name="Picture 8">
+            <a:extLst>
+              <a:ext uri="{FF2B5EF4-FFF2-40B4-BE49-F238E27FC236}">
+                <a16:creationId xmlns:a16="http://schemas.microsoft.com/office/drawing/2014/main" id="{F0E283ED-33D3-8962-7B7A-0E32D59EA8E9}"/>
+              </a:ext>
+            </a:extLst>
+          </p:cNvPr>
+          <p:cNvPicPr>
+            <a:picLocks noChangeAspect="1"/>
+          </p:cNvPicPr>
+          <p:nvPr/>
+        </p:nvPicPr>
+        <p:blipFill>
+          <a:blip r:embed="rId3"/>
+          <a:stretch>
+            <a:fillRect/>
+          </a:stretch>
+        </p:blipFill>
+        <p:spPr>
+          <a:xfrm>
+            <a:off x="639544" y="2630496"/>
+            <a:ext cx="3953427" cy="3543795"/>
+          </a:xfrm>
+          <a:prstGeom prst="rect">
+            <a:avLst/>
+          </a:prstGeom>
+        </p:spPr>
+      </p:pic>
+      <p:pic>
+        <p:nvPicPr>
+          <p:cNvPr id="12" name="Picture 11">
+            <a:extLst>
+              <a:ext uri="{FF2B5EF4-FFF2-40B4-BE49-F238E27FC236}">
+                <a16:creationId xmlns:a16="http://schemas.microsoft.com/office/drawing/2014/main" id="{6B383CED-BBCC-2DEA-BA24-88C53496AEF1}"/>
+              </a:ext>
+            </a:extLst>
+          </p:cNvPr>
+          <p:cNvPicPr>
+            <a:picLocks noChangeAspect="1"/>
+          </p:cNvPicPr>
+          <p:nvPr/>
+        </p:nvPicPr>
+        <p:blipFill>
+          <a:blip r:embed="rId4"/>
+          <a:stretch>
+            <a:fillRect/>
+          </a:stretch>
+        </p:blipFill>
+        <p:spPr>
+          <a:xfrm>
+            <a:off x="4871564" y="2746644"/>
+            <a:ext cx="4572638" cy="3200847"/>
+          </a:xfrm>
+          <a:prstGeom prst="rect">
+            <a:avLst/>
+          </a:prstGeom>
+        </p:spPr>
+      </p:pic>
     </p:spTree>
     <p:extLst>
       <p:ext uri="{BB962C8B-B14F-4D97-AF65-F5344CB8AC3E}">

</xml_diff>